<commit_message>
A bit of writing
Started on P5D_Dubins section and modified title and abstract
</commit_message>
<xml_diff>
--- a/docs/tracking_journal/fig/framework_online.pptx
+++ b/docs/tracking_journal/fig/framework_online.pptx
@@ -112,6 +112,10 @@
 </p:presentation>
 </file>
 
+<file path=ppt/revisionInfo.xml><?xml version="1.0" encoding="utf-8"?>
+<p1510:revInfo xmlns:a="http://schemas.openxmlformats.org/drawingml/2006/main" xmlns:r="http://schemas.openxmlformats.org/officeDocument/2006/relationships" xmlns:p1510="http://schemas.microsoft.com/office/powerpoint/2015/10/main"/>
+</file>
+
 <file path=ppt/slideLayouts/slideLayout1.xml><?xml version="1.0" encoding="utf-8"?>
 <p:sldLayout xmlns:a="http://schemas.openxmlformats.org/drawingml/2006/main" xmlns:r="http://schemas.openxmlformats.org/officeDocument/2006/relationships" xmlns:p="http://schemas.openxmlformats.org/presentationml/2006/main" type="title" preserve="1">
   <p:cSld name="Title Slide">
@@ -243,7 +247,7 @@
           <a:p>
             <a:fld id="{C48BF103-B019-4C03-B7DF-16D4A730CE6A}" type="datetimeFigureOut">
               <a:rPr lang="en-US" smtClean="0"/>
-              <a:t>3/19/17</a:t>
+              <a:t>4/26/2018</a:t>
             </a:fld>
             <a:endParaRPr lang="en-US"/>
           </a:p>
@@ -413,7 +417,7 @@
           <a:p>
             <a:fld id="{C48BF103-B019-4C03-B7DF-16D4A730CE6A}" type="datetimeFigureOut">
               <a:rPr lang="en-US" smtClean="0"/>
-              <a:t>3/19/17</a:t>
+              <a:t>4/26/2018</a:t>
             </a:fld>
             <a:endParaRPr lang="en-US"/>
           </a:p>
@@ -593,7 +597,7 @@
           <a:p>
             <a:fld id="{C48BF103-B019-4C03-B7DF-16D4A730CE6A}" type="datetimeFigureOut">
               <a:rPr lang="en-US" smtClean="0"/>
-              <a:t>3/19/17</a:t>
+              <a:t>4/26/2018</a:t>
             </a:fld>
             <a:endParaRPr lang="en-US"/>
           </a:p>
@@ -763,7 +767,7 @@
           <a:p>
             <a:fld id="{C48BF103-B019-4C03-B7DF-16D4A730CE6A}" type="datetimeFigureOut">
               <a:rPr lang="en-US" smtClean="0"/>
-              <a:t>3/19/17</a:t>
+              <a:t>4/26/2018</a:t>
             </a:fld>
             <a:endParaRPr lang="en-US"/>
           </a:p>
@@ -1009,7 +1013,7 @@
           <a:p>
             <a:fld id="{C48BF103-B019-4C03-B7DF-16D4A730CE6A}" type="datetimeFigureOut">
               <a:rPr lang="en-US" smtClean="0"/>
-              <a:t>3/19/17</a:t>
+              <a:t>4/26/2018</a:t>
             </a:fld>
             <a:endParaRPr lang="en-US"/>
           </a:p>
@@ -1241,7 +1245,7 @@
           <a:p>
             <a:fld id="{C48BF103-B019-4C03-B7DF-16D4A730CE6A}" type="datetimeFigureOut">
               <a:rPr lang="en-US" smtClean="0"/>
-              <a:t>3/19/17</a:t>
+              <a:t>4/26/2018</a:t>
             </a:fld>
             <a:endParaRPr lang="en-US"/>
           </a:p>
@@ -1608,7 +1612,7 @@
           <a:p>
             <a:fld id="{C48BF103-B019-4C03-B7DF-16D4A730CE6A}" type="datetimeFigureOut">
               <a:rPr lang="en-US" smtClean="0"/>
-              <a:t>3/19/17</a:t>
+              <a:t>4/26/2018</a:t>
             </a:fld>
             <a:endParaRPr lang="en-US"/>
           </a:p>
@@ -1726,7 +1730,7 @@
           <a:p>
             <a:fld id="{C48BF103-B019-4C03-B7DF-16D4A730CE6A}" type="datetimeFigureOut">
               <a:rPr lang="en-US" smtClean="0"/>
-              <a:t>3/19/17</a:t>
+              <a:t>4/26/2018</a:t>
             </a:fld>
             <a:endParaRPr lang="en-US"/>
           </a:p>
@@ -1821,7 +1825,7 @@
           <a:p>
             <a:fld id="{C48BF103-B019-4C03-B7DF-16D4A730CE6A}" type="datetimeFigureOut">
               <a:rPr lang="en-US" smtClean="0"/>
-              <a:t>3/19/17</a:t>
+              <a:t>4/26/2018</a:t>
             </a:fld>
             <a:endParaRPr lang="en-US"/>
           </a:p>
@@ -2098,7 +2102,7 @@
           <a:p>
             <a:fld id="{C48BF103-B019-4C03-B7DF-16D4A730CE6A}" type="datetimeFigureOut">
               <a:rPr lang="en-US" smtClean="0"/>
-              <a:t>3/19/17</a:t>
+              <a:t>4/26/2018</a:t>
             </a:fld>
             <a:endParaRPr lang="en-US"/>
           </a:p>
@@ -2355,7 +2359,7 @@
           <a:p>
             <a:fld id="{C48BF103-B019-4C03-B7DF-16D4A730CE6A}" type="datetimeFigureOut">
               <a:rPr lang="en-US" smtClean="0"/>
-              <a:t>3/19/17</a:t>
+              <a:t>4/26/2018</a:t>
             </a:fld>
             <a:endParaRPr lang="en-US"/>
           </a:p>
@@ -2568,7 +2572,7 @@
           <a:p>
             <a:fld id="{C48BF103-B019-4C03-B7DF-16D4A730CE6A}" type="datetimeFigureOut">
               <a:rPr lang="en-US" smtClean="0"/>
-              <a:t>3/19/17</a:t>
+              <a:t>4/26/2018</a:t>
             </a:fld>
             <a:endParaRPr lang="en-US"/>
           </a:p>
@@ -3022,7 +3026,7 @@
             <a:p>
               <a:pPr algn="ctr"/>
               <a:r>
-                <a:rPr lang="en-US" sz="2000" smtClean="0"/>
+                <a:rPr lang="en-US" sz="2000"/>
                 <a:t>Planning system</a:t>
               </a:r>
               <a:endParaRPr lang="en-US" sz="2000" dirty="0"/>
@@ -3064,10 +3068,9 @@
             <a:p>
               <a:pPr algn="ctr"/>
               <a:r>
-                <a:rPr lang="en-US" sz="2000" dirty="0" smtClean="0"/>
+                <a:rPr lang="en-US" sz="2000" dirty="0"/>
                 <a:t>Tracking system</a:t>
               </a:r>
-              <a:endParaRPr lang="en-US" sz="2000" dirty="0"/>
             </a:p>
           </p:txBody>
         </p:sp>
@@ -3443,8 +3446,8 @@
           </p:nvSpPr>
           <p:spPr>
             <a:xfrm>
-              <a:off x="5133068" y="1314697"/>
-              <a:ext cx="2165978" cy="369332"/>
+              <a:off x="5610349" y="1081325"/>
+              <a:ext cx="1586544" cy="646331"/>
             </a:xfrm>
             <a:prstGeom prst="rect">
               <a:avLst/>
@@ -3452,7 +3455,7 @@
             <a:noFill/>
           </p:spPr>
           <p:txBody>
-            <a:bodyPr wrap="none" rtlCol="0">
+            <a:bodyPr wrap="square" rtlCol="0">
               <a:spAutoFit/>
             </a:bodyPr>
             <a:lstStyle/>
@@ -3462,7 +3465,7 @@
                   <a:latin typeface="Times New Roman" panose="02020603050405020304" pitchFamily="18" charset="0"/>
                   <a:cs typeface="Times New Roman" panose="02020603050405020304" pitchFamily="18" charset="0"/>
                 </a:rPr>
-                <a:t>Augmented obstacles</a:t>
+                <a:t>Augmented constraints</a:t>
               </a:r>
             </a:p>
           </p:txBody>
@@ -3554,16 +3557,12 @@
             <a:lstStyle/>
             <a:p>
               <a:r>
-                <a:rPr lang="en-US" dirty="0" smtClean="0">
+                <a:rPr lang="en-US" dirty="0">
                   <a:latin typeface="Times New Roman" panose="02020603050405020304" pitchFamily="18" charset="0"/>
                   <a:cs typeface="Times New Roman" panose="02020603050405020304" pitchFamily="18" charset="0"/>
                 </a:rPr>
                 <a:t>Planning State</a:t>
               </a:r>
-              <a:endParaRPr lang="en-US" dirty="0">
-                <a:latin typeface="Times New Roman" panose="02020603050405020304" pitchFamily="18" charset="0"/>
-                <a:cs typeface="Times New Roman" panose="02020603050405020304" pitchFamily="18" charset="0"/>
-              </a:endParaRPr>
             </a:p>
           </p:txBody>
         </p:sp>
@@ -3594,21 +3593,7 @@
                   <a:latin typeface="Times New Roman" panose="02020603050405020304" pitchFamily="18" charset="0"/>
                   <a:cs typeface="Times New Roman" panose="02020603050405020304" pitchFamily="18" charset="0"/>
                 </a:rPr>
-                <a:t>Desired </a:t>
-              </a:r>
-              <a:r>
-                <a:rPr lang="en-US" dirty="0" smtClean="0">
-                  <a:latin typeface="Times New Roman" panose="02020603050405020304" pitchFamily="18" charset="0"/>
-                  <a:cs typeface="Times New Roman" panose="02020603050405020304" pitchFamily="18" charset="0"/>
-                </a:rPr>
-                <a:t>planning </a:t>
-              </a:r>
-              <a:r>
-                <a:rPr lang="en-US" dirty="0">
-                  <a:latin typeface="Times New Roman" panose="02020603050405020304" pitchFamily="18" charset="0"/>
-                  <a:cs typeface="Times New Roman" panose="02020603050405020304" pitchFamily="18" charset="0"/>
-                </a:rPr>
-                <a:t>state</a:t>
+                <a:t>Desired planning state</a:t>
               </a:r>
             </a:p>
           </p:txBody>

</xml_diff>

<commit_message>
revised up to V-B
</commit_message>
<xml_diff>
--- a/docs/tracking_journal/fig/framework_online.pptx
+++ b/docs/tracking_journal/fig/framework_online.pptx
@@ -112,10 +112,6 @@
 </p:presentation>
 </file>
 
-<file path=ppt/revisionInfo.xml><?xml version="1.0" encoding="utf-8"?>
-<p1510:revInfo xmlns:a="http://schemas.openxmlformats.org/drawingml/2006/main" xmlns:r="http://schemas.openxmlformats.org/officeDocument/2006/relationships" xmlns:p1510="http://schemas.microsoft.com/office/powerpoint/2015/10/main"/>
-</file>
-
 <file path=ppt/slideLayouts/slideLayout1.xml><?xml version="1.0" encoding="utf-8"?>
 <p:sldLayout xmlns:a="http://schemas.openxmlformats.org/drawingml/2006/main" xmlns:r="http://schemas.openxmlformats.org/officeDocument/2006/relationships" xmlns:p="http://schemas.openxmlformats.org/presentationml/2006/main" type="title" preserve="1">
   <p:cSld name="Title Slide">
@@ -247,7 +243,7 @@
           <a:p>
             <a:fld id="{C48BF103-B019-4C03-B7DF-16D4A730CE6A}" type="datetimeFigureOut">
               <a:rPr lang="en-US" smtClean="0"/>
-              <a:t>4/26/2018</a:t>
+              <a:t>5/2/2018</a:t>
             </a:fld>
             <a:endParaRPr lang="en-US"/>
           </a:p>
@@ -417,7 +413,7 @@
           <a:p>
             <a:fld id="{C48BF103-B019-4C03-B7DF-16D4A730CE6A}" type="datetimeFigureOut">
               <a:rPr lang="en-US" smtClean="0"/>
-              <a:t>4/26/2018</a:t>
+              <a:t>5/2/2018</a:t>
             </a:fld>
             <a:endParaRPr lang="en-US"/>
           </a:p>
@@ -597,7 +593,7 @@
           <a:p>
             <a:fld id="{C48BF103-B019-4C03-B7DF-16D4A730CE6A}" type="datetimeFigureOut">
               <a:rPr lang="en-US" smtClean="0"/>
-              <a:t>4/26/2018</a:t>
+              <a:t>5/2/2018</a:t>
             </a:fld>
             <a:endParaRPr lang="en-US"/>
           </a:p>
@@ -767,7 +763,7 @@
           <a:p>
             <a:fld id="{C48BF103-B019-4C03-B7DF-16D4A730CE6A}" type="datetimeFigureOut">
               <a:rPr lang="en-US" smtClean="0"/>
-              <a:t>4/26/2018</a:t>
+              <a:t>5/2/2018</a:t>
             </a:fld>
             <a:endParaRPr lang="en-US"/>
           </a:p>
@@ -1013,7 +1009,7 @@
           <a:p>
             <a:fld id="{C48BF103-B019-4C03-B7DF-16D4A730CE6A}" type="datetimeFigureOut">
               <a:rPr lang="en-US" smtClean="0"/>
-              <a:t>4/26/2018</a:t>
+              <a:t>5/2/2018</a:t>
             </a:fld>
             <a:endParaRPr lang="en-US"/>
           </a:p>
@@ -1245,7 +1241,7 @@
           <a:p>
             <a:fld id="{C48BF103-B019-4C03-B7DF-16D4A730CE6A}" type="datetimeFigureOut">
               <a:rPr lang="en-US" smtClean="0"/>
-              <a:t>4/26/2018</a:t>
+              <a:t>5/2/2018</a:t>
             </a:fld>
             <a:endParaRPr lang="en-US"/>
           </a:p>
@@ -1612,7 +1608,7 @@
           <a:p>
             <a:fld id="{C48BF103-B019-4C03-B7DF-16D4A730CE6A}" type="datetimeFigureOut">
               <a:rPr lang="en-US" smtClean="0"/>
-              <a:t>4/26/2018</a:t>
+              <a:t>5/2/2018</a:t>
             </a:fld>
             <a:endParaRPr lang="en-US"/>
           </a:p>
@@ -1730,7 +1726,7 @@
           <a:p>
             <a:fld id="{C48BF103-B019-4C03-B7DF-16D4A730CE6A}" type="datetimeFigureOut">
               <a:rPr lang="en-US" smtClean="0"/>
-              <a:t>4/26/2018</a:t>
+              <a:t>5/2/2018</a:t>
             </a:fld>
             <a:endParaRPr lang="en-US"/>
           </a:p>
@@ -1825,7 +1821,7 @@
           <a:p>
             <a:fld id="{C48BF103-B019-4C03-B7DF-16D4A730CE6A}" type="datetimeFigureOut">
               <a:rPr lang="en-US" smtClean="0"/>
-              <a:t>4/26/2018</a:t>
+              <a:t>5/2/2018</a:t>
             </a:fld>
             <a:endParaRPr lang="en-US"/>
           </a:p>
@@ -2102,7 +2098,7 @@
           <a:p>
             <a:fld id="{C48BF103-B019-4C03-B7DF-16D4A730CE6A}" type="datetimeFigureOut">
               <a:rPr lang="en-US" smtClean="0"/>
-              <a:t>4/26/2018</a:t>
+              <a:t>5/2/2018</a:t>
             </a:fld>
             <a:endParaRPr lang="en-US"/>
           </a:p>
@@ -2359,7 +2355,7 @@
           <a:p>
             <a:fld id="{C48BF103-B019-4C03-B7DF-16D4A730CE6A}" type="datetimeFigureOut">
               <a:rPr lang="en-US" smtClean="0"/>
-              <a:t>4/26/2018</a:t>
+              <a:t>5/2/2018</a:t>
             </a:fld>
             <a:endParaRPr lang="en-US"/>
           </a:p>
@@ -2572,7 +2568,7 @@
           <a:p>
             <a:fld id="{C48BF103-B019-4C03-B7DF-16D4A730CE6A}" type="datetimeFigureOut">
               <a:rPr lang="en-US" smtClean="0"/>
-              <a:t>4/26/2018</a:t>
+              <a:t>5/2/2018</a:t>
             </a:fld>
             <a:endParaRPr lang="en-US"/>
           </a:p>
@@ -3575,7 +3571,7 @@
           <p:spPr>
             <a:xfrm>
               <a:off x="4237988" y="2328692"/>
-              <a:ext cx="2249334" cy="369332"/>
+              <a:ext cx="1980029" cy="369332"/>
             </a:xfrm>
             <a:prstGeom prst="rect">
               <a:avLst/>
@@ -3589,11 +3585,18 @@
             <a:lstStyle/>
             <a:p>
               <a:r>
+                <a:rPr lang="en-US">
+                  <a:latin typeface="Times New Roman" panose="02020603050405020304" pitchFamily="18" charset="0"/>
+                  <a:cs typeface="Times New Roman" panose="02020603050405020304" pitchFamily="18" charset="0"/>
+                </a:rPr>
+                <a:t>Next planning </a:t>
+              </a:r>
+              <a:r>
                 <a:rPr lang="en-US" dirty="0">
                   <a:latin typeface="Times New Roman" panose="02020603050405020304" pitchFamily="18" charset="0"/>
                   <a:cs typeface="Times New Roman" panose="02020603050405020304" pitchFamily="18" charset="0"/>
                 </a:rPr>
-                <a:t>Desired planning state</a:t>
+                <a:t>state</a:t>
               </a:r>
             </a:p>
           </p:txBody>

</xml_diff>